<commit_message>
Added presentation and changes in SQL to solve the bugs
</commit_message>
<xml_diff>
--- a/Resume Challange 13.pptx
+++ b/Resume Challange 13.pptx
@@ -3934,7 +3934,7 @@
           <p:nvPr>
             <p:extLst>
               <p:ext uri="{D42A27DB-BD31-4B8C-83A1-F6EECF244321}">
-                <p14:modId xmlns:p14="http://schemas.microsoft.com/office/powerpoint/2010/main" val="1936114129"/>
+                <p14:modId xmlns:p14="http://schemas.microsoft.com/office/powerpoint/2010/main" val="2530619131"/>
               </p:ext>
             </p:extLst>
           </p:nvPr>
@@ -3995,13 +3995,13 @@
   <p:clrMapOvr>
     <a:masterClrMapping/>
   </p:clrMapOvr>
-  <mc:AlternateContent xmlns:mc="http://schemas.openxmlformats.org/markup-compatibility/2006">
-    <mc:Choice xmlns:p159="http://schemas.microsoft.com/office/powerpoint/2015/09/main" Requires="p159">
+  <mc:AlternateContent xmlns:mc="http://schemas.openxmlformats.org/markup-compatibility/2006" xmlns:p159="http://schemas.microsoft.com/office/powerpoint/2015/09/main">
+    <mc:Choice Requires="p159">
       <p:transition xmlns:p14="http://schemas.microsoft.com/office/powerpoint/2010/main" spd="slow" p14:dur="2000">
         <p159:morph option="byObject"/>
       </p:transition>
     </mc:Choice>
-    <mc:Fallback>
+    <mc:Fallback xmlns="">
       <p:transition spd="slow">
         <p:fade/>
       </p:transition>
@@ -4314,7 +4314,7 @@
             <p:ph idx="1"/>
             <p:extLst>
               <p:ext uri="{D42A27DB-BD31-4B8C-83A1-F6EECF244321}">
-                <p14:modId xmlns:p14="http://schemas.microsoft.com/office/powerpoint/2010/main" val="2060795696"/>
+                <p14:modId xmlns:p14="http://schemas.microsoft.com/office/powerpoint/2010/main" val="2548967475"/>
               </p:ext>
             </p:extLst>
           </p:nvPr>
@@ -4375,13 +4375,13 @@
   <p:clrMapOvr>
     <a:masterClrMapping/>
   </p:clrMapOvr>
-  <mc:AlternateContent xmlns:mc="http://schemas.openxmlformats.org/markup-compatibility/2006">
-    <mc:Choice xmlns:p159="http://schemas.microsoft.com/office/powerpoint/2015/09/main" Requires="p159">
+  <mc:AlternateContent xmlns:mc="http://schemas.openxmlformats.org/markup-compatibility/2006" xmlns:p159="http://schemas.microsoft.com/office/powerpoint/2015/09/main">
+    <mc:Choice Requires="p159">
       <p:transition xmlns:p14="http://schemas.microsoft.com/office/powerpoint/2010/main" spd="slow" p14:dur="2000">
         <p159:morph option="byObject"/>
       </p:transition>
     </mc:Choice>
-    <mc:Fallback>
+    <mc:Fallback xmlns="">
       <p:transition spd="slow">
         <p:fade/>
       </p:transition>
@@ -4641,7 +4641,7 @@
           <p:nvPr>
             <p:extLst>
               <p:ext uri="{D42A27DB-BD31-4B8C-83A1-F6EECF244321}">
-                <p14:modId xmlns:p14="http://schemas.microsoft.com/office/powerpoint/2010/main" val="56382902"/>
+                <p14:modId xmlns:p14="http://schemas.microsoft.com/office/powerpoint/2010/main" val="3720559257"/>
               </p:ext>
             </p:extLst>
           </p:nvPr>
@@ -4702,13 +4702,13 @@
   <p:clrMapOvr>
     <a:masterClrMapping/>
   </p:clrMapOvr>
-  <mc:AlternateContent xmlns:mc="http://schemas.openxmlformats.org/markup-compatibility/2006">
-    <mc:Choice xmlns:p159="http://schemas.microsoft.com/office/powerpoint/2015/09/main" Requires="p159">
+  <mc:AlternateContent xmlns:mc="http://schemas.openxmlformats.org/markup-compatibility/2006" xmlns:p159="http://schemas.microsoft.com/office/powerpoint/2015/09/main">
+    <mc:Choice Requires="p159">
       <p:transition xmlns:p14="http://schemas.microsoft.com/office/powerpoint/2010/main" spd="slow" p14:dur="2000">
         <p159:morph option="byObject"/>
       </p:transition>
     </mc:Choice>
-    <mc:Fallback>
+    <mc:Fallback xmlns="">
       <p:transition spd="slow">
         <p:fade/>
       </p:transition>
@@ -4989,7 +4989,7 @@
           <p:nvPr>
             <p:extLst>
               <p:ext uri="{D42A27DB-BD31-4B8C-83A1-F6EECF244321}">
-                <p14:modId xmlns:p14="http://schemas.microsoft.com/office/powerpoint/2010/main" val="585157344"/>
+                <p14:modId xmlns:p14="http://schemas.microsoft.com/office/powerpoint/2010/main" val="285339027"/>
               </p:ext>
             </p:extLst>
           </p:nvPr>
@@ -5050,13 +5050,13 @@
   <p:clrMapOvr>
     <a:masterClrMapping/>
   </p:clrMapOvr>
-  <mc:AlternateContent xmlns:mc="http://schemas.openxmlformats.org/markup-compatibility/2006">
-    <mc:Choice xmlns:p159="http://schemas.microsoft.com/office/powerpoint/2015/09/main" Requires="p159">
+  <mc:AlternateContent xmlns:mc="http://schemas.openxmlformats.org/markup-compatibility/2006" xmlns:p159="http://schemas.microsoft.com/office/powerpoint/2015/09/main">
+    <mc:Choice Requires="p159">
       <p:transition xmlns:p14="http://schemas.microsoft.com/office/powerpoint/2010/main" spd="slow" p14:dur="2000">
         <p159:morph option="byObject"/>
       </p:transition>
     </mc:Choice>
-    <mc:Fallback>
+    <mc:Fallback xmlns="">
       <p:transition spd="slow">
         <p:fade/>
       </p:transition>
@@ -5383,72 +5383,6 @@
           </a:p>
         </p:txBody>
       </p:sp>
-      <p:graphicFrame>
-        <p:nvGraphicFramePr>
-          <p:cNvPr id="3" name="Object 2">
-            <a:extLst>
-              <a:ext uri="{FF2B5EF4-FFF2-40B4-BE49-F238E27FC236}">
-                <a16:creationId xmlns:a16="http://schemas.microsoft.com/office/drawing/2014/main" id="{73DF56AA-C5E0-569A-92B1-5F5EC1D3FF2E}"/>
-              </a:ext>
-            </a:extLst>
-          </p:cNvPr>
-          <p:cNvGraphicFramePr>
-            <a:graphicFrameLocks noChangeAspect="1"/>
-          </p:cNvGraphicFramePr>
-          <p:nvPr>
-            <p:extLst>
-              <p:ext uri="{D42A27DB-BD31-4B8C-83A1-F6EECF244321}">
-                <p14:modId xmlns:p14="http://schemas.microsoft.com/office/powerpoint/2010/main" val="394959403"/>
-              </p:ext>
-            </p:extLst>
-          </p:nvPr>
-        </p:nvGraphicFramePr>
-        <p:xfrm>
-          <a:off x="3029714" y="1713212"/>
-          <a:ext cx="6132571" cy="4556337"/>
-        </p:xfrm>
-        <a:graphic>
-          <a:graphicData uri="http://schemas.openxmlformats.org/presentationml/2006/ole">
-            <mc:AlternateContent xmlns:mc="http://schemas.openxmlformats.org/markup-compatibility/2006">
-              <mc:Choice xmlns:v="urn:schemas-microsoft-com:vml" Requires="v">
-                <p:oleObj name="Macro-Enabled Worksheet" r:id="rId2" imgW="7953312" imgH="5915025" progId="Excel.SheetMacroEnabled.12">
-                  <p:embed/>
-                </p:oleObj>
-              </mc:Choice>
-              <mc:Fallback>
-                <p:oleObj name="Macro-Enabled Worksheet" r:id="rId2" imgW="7953312" imgH="5915025" progId="Excel.SheetMacroEnabled.12">
-                  <p:embed/>
-                  <p:pic>
-                    <p:nvPicPr>
-                      <p:cNvPr id="0" name=""/>
-                      <p:cNvPicPr/>
-                      <p:nvPr/>
-                    </p:nvPicPr>
-                    <p:blipFill>
-                      <a:blip r:embed="rId3"/>
-                      <a:stretch>
-                        <a:fillRect/>
-                      </a:stretch>
-                    </p:blipFill>
-                    <p:spPr>
-                      <a:xfrm>
-                        <a:off x="3029714" y="1713212"/>
-                        <a:ext cx="6132571" cy="4556337"/>
-                      </a:xfrm>
-                      <a:prstGeom prst="rect">
-                        <a:avLst/>
-                      </a:prstGeom>
-                      <a:solidFill>
-                        <a:srgbClr val="DAA520"/>
-                      </a:solidFill>
-                    </p:spPr>
-                  </p:pic>
-                </p:oleObj>
-              </mc:Fallback>
-            </mc:AlternateContent>
-          </a:graphicData>
-        </a:graphic>
-      </p:graphicFrame>
       <p:pic>
         <p:nvPicPr>
           <p:cNvPr id="8" name="Picture 7" descr="A yellow taxi car with black and white stripes&#10;&#10;Description automatically generated">
@@ -5464,7 +5398,7 @@
           <p:nvPr/>
         </p:nvPicPr>
         <p:blipFill>
-          <a:blip r:embed="rId4"/>
+          <a:blip r:embed="rId2"/>
           <a:stretch>
             <a:fillRect/>
           </a:stretch>
@@ -5494,7 +5428,7 @@
           <p:nvPr/>
         </p:nvPicPr>
         <p:blipFill>
-          <a:blip r:embed="rId4"/>
+          <a:blip r:embed="rId2"/>
           <a:stretch>
             <a:fillRect/>
           </a:stretch>
@@ -5509,6 +5443,72 @@
           </a:prstGeom>
         </p:spPr>
       </p:pic>
+      <p:graphicFrame>
+        <p:nvGraphicFramePr>
+          <p:cNvPr id="4" name="Object 3">
+            <a:extLst>
+              <a:ext uri="{FF2B5EF4-FFF2-40B4-BE49-F238E27FC236}">
+                <a16:creationId xmlns:a16="http://schemas.microsoft.com/office/drawing/2014/main" id="{E65E9CB2-3589-B1CE-9410-03D00CFD3E9C}"/>
+              </a:ext>
+            </a:extLst>
+          </p:cNvPr>
+          <p:cNvGraphicFramePr>
+            <a:graphicFrameLocks noChangeAspect="1"/>
+          </p:cNvGraphicFramePr>
+          <p:nvPr>
+            <p:extLst>
+              <p:ext uri="{D42A27DB-BD31-4B8C-83A1-F6EECF244321}">
+                <p14:modId xmlns:p14="http://schemas.microsoft.com/office/powerpoint/2010/main" val="3689069682"/>
+              </p:ext>
+            </p:extLst>
+          </p:nvPr>
+        </p:nvGraphicFramePr>
+        <p:xfrm>
+          <a:off x="2676559" y="1782763"/>
+          <a:ext cx="6838882" cy="3786187"/>
+        </p:xfrm>
+        <a:graphic>
+          <a:graphicData uri="http://schemas.openxmlformats.org/presentationml/2006/ole">
+            <mc:AlternateContent xmlns:mc="http://schemas.openxmlformats.org/markup-compatibility/2006">
+              <mc:Choice xmlns:v="urn:schemas-microsoft-com:vml" Requires="v">
+                <p:oleObj name="Macro-Enabled Worksheet" r:id="rId3" imgW="9429646" imgH="6296064" progId="Excel.SheetMacroEnabled.12">
+                  <p:embed/>
+                </p:oleObj>
+              </mc:Choice>
+              <mc:Fallback>
+                <p:oleObj name="Macro-Enabled Worksheet" r:id="rId3" imgW="9429646" imgH="6296064" progId="Excel.SheetMacroEnabled.12">
+                  <p:embed/>
+                  <p:pic>
+                    <p:nvPicPr>
+                      <p:cNvPr id="0" name=""/>
+                      <p:cNvPicPr/>
+                      <p:nvPr/>
+                    </p:nvPicPr>
+                    <p:blipFill>
+                      <a:blip r:embed="rId4"/>
+                      <a:stretch>
+                        <a:fillRect/>
+                      </a:stretch>
+                    </p:blipFill>
+                    <p:spPr>
+                      <a:xfrm>
+                        <a:off x="2676559" y="1782763"/>
+                        <a:ext cx="6838882" cy="3786187"/>
+                      </a:xfrm>
+                      <a:prstGeom prst="rect">
+                        <a:avLst/>
+                      </a:prstGeom>
+                      <a:solidFill>
+                        <a:srgbClr val="DAA520"/>
+                      </a:solidFill>
+                    </p:spPr>
+                  </p:pic>
+                </p:oleObj>
+              </mc:Fallback>
+            </mc:AlternateContent>
+          </a:graphicData>
+        </a:graphic>
+      </p:graphicFrame>
     </p:spTree>
     <p:extLst>
       <p:ext uri="{BB962C8B-B14F-4D97-AF65-F5344CB8AC3E}">
@@ -5519,13 +5519,13 @@
   <p:clrMapOvr>
     <a:masterClrMapping/>
   </p:clrMapOvr>
-  <mc:AlternateContent xmlns:mc="http://schemas.openxmlformats.org/markup-compatibility/2006">
-    <mc:Choice xmlns:p159="http://schemas.microsoft.com/office/powerpoint/2015/09/main" Requires="p159">
+  <mc:AlternateContent xmlns:mc="http://schemas.openxmlformats.org/markup-compatibility/2006" xmlns:p159="http://schemas.microsoft.com/office/powerpoint/2015/09/main">
+    <mc:Choice Requires="p159">
       <p:transition xmlns:p14="http://schemas.microsoft.com/office/powerpoint/2010/main" spd="slow" p14:dur="2000">
         <p159:morph option="byObject"/>
       </p:transition>
     </mc:Choice>
-    <mc:Fallback>
+    <mc:Fallback xmlns="">
       <p:transition spd="slow">
         <p:fade/>
       </p:transition>
@@ -5940,13 +5940,13 @@
   <p:clrMapOvr>
     <a:masterClrMapping/>
   </p:clrMapOvr>
-  <mc:AlternateContent xmlns:mc="http://schemas.openxmlformats.org/markup-compatibility/2006">
-    <mc:Choice xmlns:p159="http://schemas.microsoft.com/office/powerpoint/2015/09/main" Requires="p159">
+  <mc:AlternateContent xmlns:mc="http://schemas.openxmlformats.org/markup-compatibility/2006" xmlns:p159="http://schemas.microsoft.com/office/powerpoint/2015/09/main">
+    <mc:Choice Requires="p159">
       <p:transition xmlns:p14="http://schemas.microsoft.com/office/powerpoint/2010/main" spd="slow" p14:dur="2000">
         <p159:morph option="byObject"/>
       </p:transition>
     </mc:Choice>
-    <mc:Fallback>
+    <mc:Fallback xmlns="">
       <p:transition spd="slow">
         <p:fade/>
       </p:transition>
@@ -7160,13 +7160,13 @@
   <p:clrMapOvr>
     <a:masterClrMapping/>
   </p:clrMapOvr>
-  <mc:AlternateContent xmlns:mc="http://schemas.openxmlformats.org/markup-compatibility/2006">
-    <mc:Choice xmlns:p159="http://schemas.microsoft.com/office/powerpoint/2015/09/main" Requires="p159">
+  <mc:AlternateContent xmlns:mc="http://schemas.openxmlformats.org/markup-compatibility/2006" xmlns:p159="http://schemas.microsoft.com/office/powerpoint/2015/09/main">
+    <mc:Choice Requires="p159">
       <p:transition xmlns:p14="http://schemas.microsoft.com/office/powerpoint/2010/main" spd="slow" p14:dur="2000">
         <p159:morph option="byObject"/>
       </p:transition>
     </mc:Choice>
-    <mc:Fallback>
+    <mc:Fallback xmlns="">
       <p:transition spd="slow">
         <p:fade/>
       </p:transition>
@@ -7794,13 +7794,13 @@
   <p:clrMapOvr>
     <a:masterClrMapping/>
   </p:clrMapOvr>
-  <mc:AlternateContent xmlns:mc="http://schemas.openxmlformats.org/markup-compatibility/2006">
-    <mc:Choice xmlns:p159="http://schemas.microsoft.com/office/powerpoint/2015/09/main" Requires="p159">
+  <mc:AlternateContent xmlns:mc="http://schemas.openxmlformats.org/markup-compatibility/2006" xmlns:p159="http://schemas.microsoft.com/office/powerpoint/2015/09/main">
+    <mc:Choice Requires="p159">
       <p:transition xmlns:p14="http://schemas.microsoft.com/office/powerpoint/2010/main" spd="slow" p14:dur="2000">
         <p159:morph option="byObject"/>
       </p:transition>
     </mc:Choice>
-    <mc:Fallback>
+    <mc:Fallback xmlns="">
       <p:transition spd="slow">
         <p:fade/>
       </p:transition>
@@ -8056,13 +8056,13 @@
   <p:clrMapOvr>
     <a:masterClrMapping/>
   </p:clrMapOvr>
-  <mc:AlternateContent xmlns:mc="http://schemas.openxmlformats.org/markup-compatibility/2006">
-    <mc:Choice xmlns:p159="http://schemas.microsoft.com/office/powerpoint/2015/09/main" Requires="p159">
+  <mc:AlternateContent xmlns:mc="http://schemas.openxmlformats.org/markup-compatibility/2006" xmlns:p159="http://schemas.microsoft.com/office/powerpoint/2015/09/main">
+    <mc:Choice Requires="p159">
       <p:transition xmlns:p14="http://schemas.microsoft.com/office/powerpoint/2010/main" spd="slow" p14:dur="2000">
         <p159:morph option="byObject"/>
       </p:transition>
     </mc:Choice>
-    <mc:Fallback>
+    <mc:Fallback xmlns="">
       <p:transition spd="slow">
         <p:fade/>
       </p:transition>
@@ -9254,13 +9254,13 @@
   <p:clrMapOvr>
     <a:masterClrMapping/>
   </p:clrMapOvr>
-  <mc:AlternateContent xmlns:mc="http://schemas.openxmlformats.org/markup-compatibility/2006">
-    <mc:Choice xmlns:p159="http://schemas.microsoft.com/office/powerpoint/2015/09/main" Requires="p159">
+  <mc:AlternateContent xmlns:mc="http://schemas.openxmlformats.org/markup-compatibility/2006" xmlns:p159="http://schemas.microsoft.com/office/powerpoint/2015/09/main">
+    <mc:Choice Requires="p159">
       <p:transition xmlns:p14="http://schemas.microsoft.com/office/powerpoint/2010/main" spd="slow" p14:dur="2000">
         <p159:morph option="byObject"/>
       </p:transition>
     </mc:Choice>
-    <mc:Fallback>
+    <mc:Fallback xmlns="">
       <p:transition spd="slow">
         <p:fade/>
       </p:transition>
@@ -9982,7 +9982,7 @@
             <p:ph idx="1"/>
             <p:extLst>
               <p:ext uri="{D42A27DB-BD31-4B8C-83A1-F6EECF244321}">
-                <p14:modId xmlns:p14="http://schemas.microsoft.com/office/powerpoint/2010/main" val="2816200878"/>
+                <p14:modId xmlns:p14="http://schemas.microsoft.com/office/powerpoint/2010/main" val="2528192397"/>
               </p:ext>
             </p:extLst>
           </p:nvPr>
@@ -10043,13 +10043,13 @@
   <p:clrMapOvr>
     <a:masterClrMapping/>
   </p:clrMapOvr>
-  <mc:AlternateContent xmlns:mc="http://schemas.openxmlformats.org/markup-compatibility/2006">
-    <mc:Choice xmlns:p159="http://schemas.microsoft.com/office/powerpoint/2015/09/main" Requires="p159">
+  <mc:AlternateContent xmlns:mc="http://schemas.openxmlformats.org/markup-compatibility/2006" xmlns:p159="http://schemas.microsoft.com/office/powerpoint/2015/09/main">
+    <mc:Choice Requires="p159">
       <p:transition xmlns:p14="http://schemas.microsoft.com/office/powerpoint/2010/main" spd="slow" p14:dur="2000">
         <p159:morph option="byObject"/>
       </p:transition>
     </mc:Choice>
-    <mc:Fallback>
+    <mc:Fallback xmlns="">
       <p:transition spd="slow">
         <p:fade/>
       </p:transition>

</xml_diff>